<commit_message>
adding num of significant features
</commit_message>
<xml_diff>
--- a/Leukemia Detection.pptx
+++ b/Leukemia Detection.pptx
@@ -16939,7 +16939,7 @@
           <a:graphicData uri="http://schemas.openxmlformats.org/presentationml/2006/ole">
             <mc:AlternateContent xmlns:mc="http://schemas.openxmlformats.org/markup-compatibility/2006">
               <mc:Choice xmlns:v="urn:schemas-microsoft-com:vml" Requires="v">
-                <p:oleObj spid="_x0000_s4566" name="Worksheet" r:id="rId4" imgW="12573239" imgH="6876979" progId="Excel.Sheet.12">
+                <p:oleObj spid="_x0000_s4570" name="Worksheet" r:id="rId4" imgW="12573239" imgH="6876979" progId="Excel.Sheet.12">
                   <p:link updateAutomatic="1"/>
                 </p:oleObj>
               </mc:Choice>
@@ -25215,7 +25215,7 @@
           <p:nvPr>
             <p:extLst>
               <p:ext uri="{D42A27DB-BD31-4B8C-83A1-F6EECF244321}">
-                <p14:modId xmlns:p14="http://schemas.microsoft.com/office/powerpoint/2010/main" val="772479476"/>
+                <p14:modId xmlns:p14="http://schemas.microsoft.com/office/powerpoint/2010/main" val="188439029"/>
               </p:ext>
             </p:extLst>
           </p:nvPr>
@@ -25448,7 +25448,7 @@
           <p:nvPr>
             <p:extLst>
               <p:ext uri="{D42A27DB-BD31-4B8C-83A1-F6EECF244321}">
-                <p14:modId xmlns:p14="http://schemas.microsoft.com/office/powerpoint/2010/main" val="1183742984"/>
+                <p14:modId xmlns:p14="http://schemas.microsoft.com/office/powerpoint/2010/main" val="3896004130"/>
               </p:ext>
             </p:extLst>
           </p:nvPr>
@@ -26334,7 +26334,7 @@
           <p:nvPr>
             <p:extLst>
               <p:ext uri="{D42A27DB-BD31-4B8C-83A1-F6EECF244321}">
-                <p14:modId xmlns:p14="http://schemas.microsoft.com/office/powerpoint/2010/main" val="4123042967"/>
+                <p14:modId xmlns:p14="http://schemas.microsoft.com/office/powerpoint/2010/main" val="4006406204"/>
               </p:ext>
             </p:extLst>
           </p:nvPr>
@@ -26347,7 +26347,7 @@
           <a:graphicData uri="http://schemas.openxmlformats.org/presentationml/2006/ole">
             <mc:AlternateContent xmlns:mc="http://schemas.openxmlformats.org/markup-compatibility/2006">
               <mc:Choice xmlns:v="urn:schemas-microsoft-com:vml" Requires="v">
-                <p:oleObj spid="_x0000_s2618" name="Worksheet" r:id="rId6" imgW="11982470" imgH="6781765" progId="Excel.Sheet.12">
+                <p:oleObj spid="_x0000_s2622" name="Worksheet" r:id="rId6" imgW="11982470" imgH="6781765" progId="Excel.Sheet.12">
                   <p:link updateAutomatic="1"/>
                 </p:oleObj>
               </mc:Choice>

</xml_diff>

<commit_message>
adding some more pictures
</commit_message>
<xml_diff>
--- a/Leukemia Detection.pptx
+++ b/Leukemia Detection.pptx
@@ -16939,7 +16939,7 @@
           <a:graphicData uri="http://schemas.openxmlformats.org/presentationml/2006/ole">
             <mc:AlternateContent xmlns:mc="http://schemas.openxmlformats.org/markup-compatibility/2006">
               <mc:Choice xmlns:v="urn:schemas-microsoft-com:vml" Requires="v">
-                <p:oleObj spid="_x0000_s4570" name="Worksheet" r:id="rId4" imgW="12573239" imgH="6876979" progId="Excel.Sheet.12">
+                <p:oleObj spid="_x0000_s4572" name="Worksheet" r:id="rId4" imgW="12573239" imgH="6876979" progId="Excel.Sheet.12">
                   <p:link updateAutomatic="1"/>
                 </p:oleObj>
               </mc:Choice>
@@ -26347,7 +26347,7 @@
           <a:graphicData uri="http://schemas.openxmlformats.org/presentationml/2006/ole">
             <mc:AlternateContent xmlns:mc="http://schemas.openxmlformats.org/markup-compatibility/2006">
               <mc:Choice xmlns:v="urn:schemas-microsoft-com:vml" Requires="v">
-                <p:oleObj spid="_x0000_s2622" name="Worksheet" r:id="rId6" imgW="11982470" imgH="6781765" progId="Excel.Sheet.12">
+                <p:oleObj spid="_x0000_s2624" name="Worksheet" r:id="rId6" imgW="11982470" imgH="6781765" progId="Excel.Sheet.12">
                   <p:link updateAutomatic="1"/>
                 </p:oleObj>
               </mc:Choice>

</xml_diff>

<commit_message>
adding cos sim, num_zeros charts and 2 pages left to write
</commit_message>
<xml_diff>
--- a/Leukemia Detection.pptx
+++ b/Leukemia Detection.pptx
@@ -15080,7 +15080,7 @@
             <p:ph idx="1"/>
             <p:extLst>
               <p:ext uri="{D42A27DB-BD31-4B8C-83A1-F6EECF244321}">
-                <p14:modId xmlns:p14="http://schemas.microsoft.com/office/powerpoint/2010/main" val="4084300927"/>
+                <p14:modId xmlns:p14="http://schemas.microsoft.com/office/powerpoint/2010/main" val="1719454250"/>
               </p:ext>
             </p:extLst>
           </p:nvPr>
@@ -15927,7 +15927,7 @@
           <p:nvPr>
             <p:extLst>
               <p:ext uri="{D42A27DB-BD31-4B8C-83A1-F6EECF244321}">
-                <p14:modId xmlns:p14="http://schemas.microsoft.com/office/powerpoint/2010/main" val="684003059"/>
+                <p14:modId xmlns:p14="http://schemas.microsoft.com/office/powerpoint/2010/main" val="663258182"/>
               </p:ext>
             </p:extLst>
           </p:nvPr>
@@ -16112,7 +16112,7 @@
                     <a:p>
                       <a:pPr marL="0" algn="ctr" defTabSz="457200" rtl="0" eaLnBrk="1" fontAlgn="b" latinLnBrk="0" hangingPunct="1"/>
                       <a:r>
-                        <a:rPr lang="en-US" sz="1400" kern="1200">
+                        <a:rPr lang="en-US" sz="1400" kern="1200" dirty="0">
                           <a:solidFill>
                             <a:schemeClr val="dk1"/>
                           </a:solidFill>
@@ -16939,7 +16939,7 @@
           <a:graphicData uri="http://schemas.openxmlformats.org/presentationml/2006/ole">
             <mc:AlternateContent xmlns:mc="http://schemas.openxmlformats.org/markup-compatibility/2006">
               <mc:Choice xmlns:v="urn:schemas-microsoft-com:vml" Requires="v">
-                <p:oleObj spid="_x0000_s4572" name="Worksheet" r:id="rId4" imgW="12573239" imgH="6876979" progId="Excel.Sheet.12">
+                <p:oleObj spid="_x0000_s4578" name="Worksheet" r:id="rId4" imgW="12573239" imgH="6876979" progId="Excel.Sheet.12">
                   <p:link updateAutomatic="1"/>
                 </p:oleObj>
               </mc:Choice>
@@ -26347,7 +26347,7 @@
           <a:graphicData uri="http://schemas.openxmlformats.org/presentationml/2006/ole">
             <mc:AlternateContent xmlns:mc="http://schemas.openxmlformats.org/markup-compatibility/2006">
               <mc:Choice xmlns:v="urn:schemas-microsoft-com:vml" Requires="v">
-                <p:oleObj spid="_x0000_s2624" name="Worksheet" r:id="rId6" imgW="11982470" imgH="6781765" progId="Excel.Sheet.12">
+                <p:oleObj spid="_x0000_s2630" name="Worksheet" r:id="rId6" imgW="11982470" imgH="6781765" progId="Excel.Sheet.12">
                   <p:link updateAutomatic="1"/>
                 </p:oleObj>
               </mc:Choice>

</xml_diff>